<commit_message>
Addnig Mike Godfre's slides
</commit_message>
<xml_diff>
--- a/Mike_Godfrey.pptx
+++ b/Mike_Godfrey.pptx
@@ -278,7 +278,7 @@
             <a:fld id="{3FEF59F6-3BB3-4A43-9836-B397634EC86A}" type="datetime1">
               <a:rPr lang="en-US" altLang="en-US"/>
               <a:pPr/>
-              <a:t>12/4/19</a:t>
+              <a:t>12/5/19</a:t>
             </a:fld>
             <a:endParaRPr lang="en-US" altLang="en-US"/>
           </a:p>
@@ -506,7 +506,7 @@
             <a:fld id="{81594D97-A3C7-7F4F-8229-59080D723279}" type="datetime1">
               <a:rPr lang="en-US" altLang="en-US"/>
               <a:pPr/>
-              <a:t>12/4/19</a:t>
+              <a:t>12/5/19</a:t>
             </a:fld>
             <a:endParaRPr lang="en-US" altLang="en-US"/>
           </a:p>
@@ -5259,15 +5259,7 @@
             </a:r>
             <a:r>
               <a:rPr lang="en-CA" sz="2000" dirty="0"/>
-              <a:t> dev (e.g., code review, </a:t>
-            </a:r>
-            <a:r>
-              <a:rPr lang="en-CA" sz="2000" dirty="0" err="1"/>
-              <a:t>sw</a:t>
-            </a:r>
-            <a:r>
-              <a:rPr lang="en-CA" sz="2000" dirty="0"/>
-              <a:t> evolution)</a:t>
+              <a:t> dev (e.g., Linux evolution, code review)</a:t>
             </a:r>
           </a:p>
           <a:p>
@@ -6042,8 +6034,8 @@
         </p:blipFill>
         <p:spPr>
           <a:xfrm>
-            <a:off x="4718386" y="1956519"/>
-            <a:ext cx="4356501" cy="3223811"/>
+            <a:off x="5738216" y="2603041"/>
+            <a:ext cx="3405784" cy="2520280"/>
           </a:xfrm>
           <a:prstGeom prst="rect">
             <a:avLst/>
@@ -6093,8 +6085,8 @@
         </p:nvSpPr>
         <p:spPr>
           <a:xfrm>
-            <a:off x="457201" y="1600200"/>
-            <a:ext cx="4732700" cy="4525963"/>
+            <a:off x="457200" y="1600200"/>
+            <a:ext cx="5338935" cy="4525963"/>
           </a:xfrm>
         </p:spPr>
         <p:txBody>
@@ -6112,7 +6104,7 @@
             </a:pPr>
             <a:r>
               <a:rPr lang="en-US" sz="2400" dirty="0"/>
-              <a:t>Do reviewers miss a lot of bugs?</a:t>
+              <a:t>Do Mozilla reviewers miss a lot of bugs?</a:t>
             </a:r>
           </a:p>
           <a:p>
@@ -6184,8 +6176,8 @@
         </p:nvSpPr>
         <p:spPr>
           <a:xfrm>
-            <a:off x="5796136" y="6425404"/>
-            <a:ext cx="3452997" cy="400110"/>
+            <a:off x="4572000" y="6408057"/>
+            <a:ext cx="4595938" cy="400110"/>
           </a:xfrm>
           <a:prstGeom prst="rect">
             <a:avLst/>
@@ -6214,7 +6206,96 @@
               <a:rPr lang="en-US" sz="2000" dirty="0">
                 <a:latin typeface="+mn-lt"/>
               </a:rPr>
-              <a:t>ICSME 2015]</a:t>
+              <a:t>ICSME 2015, ICSE 2016]</a:t>
+            </a:r>
+          </a:p>
+        </p:txBody>
+      </p:sp>
+      <p:sp>
+        <p:nvSpPr>
+          <p:cNvPr id="2" name="TextBox 1">
+            <a:extLst>
+              <a:ext uri="{FF2B5EF4-FFF2-40B4-BE49-F238E27FC236}">
+                <a16:creationId xmlns:a16="http://schemas.microsoft.com/office/drawing/2014/main" id="{20AC0440-3EE4-6542-839F-6E8BFD304BB0}"/>
+              </a:ext>
+            </a:extLst>
+          </p:cNvPr>
+          <p:cNvSpPr txBox="1"/>
+          <p:nvPr/>
+        </p:nvSpPr>
+        <p:spPr>
+          <a:xfrm>
+            <a:off x="971600" y="2420479"/>
+            <a:ext cx="7495323" cy="2431435"/>
+          </a:xfrm>
+          <a:prstGeom prst="rect">
+            <a:avLst/>
+          </a:prstGeom>
+          <a:solidFill>
+            <a:schemeClr val="accent6">
+              <a:lumMod val="20000"/>
+              <a:lumOff val="80000"/>
+            </a:schemeClr>
+          </a:solidFill>
+          <a:ln w="63500">
+            <a:solidFill>
+              <a:srgbClr val="FF0000"/>
+            </a:solidFill>
+          </a:ln>
+          <a:effectLst/>
+        </p:spPr>
+        <p:txBody>
+          <a:bodyPr wrap="square" rtlCol="0">
+            <a:spAutoFit/>
+          </a:bodyPr>
+          <a:lstStyle/>
+          <a:p>
+            <a:r>
+              <a:rPr lang="en-US" sz="2800" dirty="0">
+                <a:latin typeface="+mn-lt"/>
+              </a:rPr>
+              <a:t>Challenges — Better modelling &amp; assessment of:</a:t>
+            </a:r>
+          </a:p>
+          <a:p>
+            <a:endParaRPr lang="en-US" sz="2800" dirty="0">
+              <a:latin typeface="+mn-lt"/>
+            </a:endParaRPr>
+          </a:p>
+          <a:p>
+            <a:pPr marL="342900" indent="-342900">
+              <a:buFont typeface="Arial" panose="020B0604020202020204" pitchFamily="34" charset="0"/>
+              <a:buChar char="•"/>
+            </a:pPr>
+            <a:r>
+              <a:rPr lang="en-US" dirty="0">
+                <a:latin typeface="+mn-lt"/>
+              </a:rPr>
+              <a:t>Costs &amp; risks for developers </a:t>
+            </a:r>
+          </a:p>
+          <a:p>
+            <a:pPr marL="342900" indent="-342900">
+              <a:buFont typeface="Arial" panose="020B0604020202020204" pitchFamily="34" charset="0"/>
+              <a:buChar char="•"/>
+            </a:pPr>
+            <a:r>
+              <a:rPr lang="en-US" dirty="0">
+                <a:latin typeface="+mn-lt"/>
+              </a:rPr>
+              <a:t>"Soft"/qualitative data, esp. about developers</a:t>
+            </a:r>
+          </a:p>
+          <a:p>
+            <a:pPr marL="342900" indent="-342900">
+              <a:buFont typeface="Arial" panose="020B0604020202020204" pitchFamily="34" charset="0"/>
+              <a:buChar char="•"/>
+            </a:pPr>
+            <a:r>
+              <a:rPr lang="en-US" dirty="0">
+                <a:latin typeface="+mn-lt"/>
+              </a:rPr>
+              <a:t>Process models and instrumentation opportunities for model app development</a:t>
             </a:r>
           </a:p>
         </p:txBody>
@@ -6420,6 +6501,59 @@
                       </p:childTnLst>
                     </p:cTn>
                   </p:par>
+                  <p:par>
+                    <p:cTn id="18" fill="hold">
+                      <p:stCondLst>
+                        <p:cond delay="indefinite"/>
+                      </p:stCondLst>
+                      <p:childTnLst>
+                        <p:par>
+                          <p:cTn id="19" fill="hold">
+                            <p:stCondLst>
+                              <p:cond delay="0"/>
+                            </p:stCondLst>
+                            <p:childTnLst>
+                              <p:par>
+                                <p:cTn id="20" presetID="9" presetClass="entr" presetSubtype="0" fill="hold" grpId="0" nodeType="clickEffect">
+                                  <p:stCondLst>
+                                    <p:cond delay="0"/>
+                                  </p:stCondLst>
+                                  <p:childTnLst>
+                                    <p:set>
+                                      <p:cBhvr>
+                                        <p:cTn id="21" dur="1" fill="hold">
+                                          <p:stCondLst>
+                                            <p:cond delay="0"/>
+                                          </p:stCondLst>
+                                        </p:cTn>
+                                        <p:tgtEl>
+                                          <p:spTgt spid="2"/>
+                                        </p:tgtEl>
+                                        <p:attrNameLst>
+                                          <p:attrName>style.visibility</p:attrName>
+                                        </p:attrNameLst>
+                                      </p:cBhvr>
+                                      <p:to>
+                                        <p:strVal val="visible"/>
+                                      </p:to>
+                                    </p:set>
+                                    <p:animEffect transition="in" filter="dissolve">
+                                      <p:cBhvr>
+                                        <p:cTn id="22" dur="500"/>
+                                        <p:tgtEl>
+                                          <p:spTgt spid="2"/>
+                                        </p:tgtEl>
+                                      </p:cBhvr>
+                                    </p:animEffect>
+                                  </p:childTnLst>
+                                </p:cTn>
+                              </p:par>
+                            </p:childTnLst>
+                          </p:cTn>
+                        </p:par>
+                      </p:childTnLst>
+                    </p:cTn>
+                  </p:par>
                 </p:childTnLst>
               </p:cTn>
               <p:prevCondLst>
@@ -6441,6 +6575,9 @@
         </p:cTn>
       </p:par>
     </p:tnLst>
+    <p:bldLst>
+      <p:bldP spid="2" grpId="0" animBg="1"/>
+    </p:bldLst>
   </p:timing>
 </p:sld>
 </file>

</xml_diff>